<commit_message>
Inclusao nova tabela no modelo relacional
</commit_message>
<xml_diff>
--- a/PastaDocumentosProjeto/ModeloRelacional.pptx
+++ b/PastaDocumentosProjeto/ModeloRelacional.pptx
@@ -104,6 +104,11 @@
       </a:defRPr>
     </a:lvl9pPr>
   </p:defaultTextStyle>
+  <p:extLst>
+    <p:ext uri="{EFAFB233-063F-42B5-8137-9DF3F51BA10A}">
+      <p15:sldGuideLst xmlns:p15="http://schemas.microsoft.com/office/powerpoint/2012/main"/>
+    </p:ext>
+  </p:extLst>
 </p:presentation>
 </file>
 
@@ -3531,6 +3536,171 @@
           </a:p>
         </p:txBody>
       </p:sp>
+      <p:sp>
+        <p:nvSpPr>
+          <p:cNvPr id="2" name="Rectangle 1">
+            <a:extLst>
+              <a:ext uri="{FF2B5EF4-FFF2-40B4-BE49-F238E27FC236}">
+                <a16:creationId xmlns:a16="http://schemas.microsoft.com/office/drawing/2014/main" id="{7484B7C8-87C6-47A8-A654-300C6F2E7E9C}"/>
+              </a:ext>
+            </a:extLst>
+          </p:cNvPr>
+          <p:cNvSpPr/>
+          <p:nvPr/>
+        </p:nvSpPr>
+        <p:spPr>
+          <a:xfrm>
+            <a:off x="2601310" y="3042745"/>
+            <a:ext cx="2081049" cy="1135116"/>
+          </a:xfrm>
+          <a:prstGeom prst="rect">
+            <a:avLst/>
+          </a:prstGeom>
+        </p:spPr>
+        <p:style>
+          <a:lnRef idx="2">
+            <a:schemeClr val="accent1">
+              <a:shade val="50000"/>
+            </a:schemeClr>
+          </a:lnRef>
+          <a:fillRef idx="1">
+            <a:schemeClr val="accent1"/>
+          </a:fillRef>
+          <a:effectRef idx="0">
+            <a:schemeClr val="accent1"/>
+          </a:effectRef>
+          <a:fontRef idx="minor">
+            <a:schemeClr val="lt1"/>
+          </a:fontRef>
+        </p:style>
+        <p:txBody>
+          <a:bodyPr rtlCol="0" anchor="ctr"/>
+          <a:lstStyle/>
+          <a:p>
+            <a:pPr algn="ctr"/>
+            <a:r>
+              <a:rPr lang="pt-BR" dirty="0" err="1"/>
+              <a:t>Tab</a:t>
+            </a:r>
+            <a:r>
+              <a:rPr lang="pt-BR" dirty="0"/>
+              <a:t> 3</a:t>
+            </a:r>
+            <a:endParaRPr lang="en-US" dirty="0"/>
+          </a:p>
+        </p:txBody>
+      </p:sp>
+      <p:cxnSp>
+        <p:nvCxnSpPr>
+          <p:cNvPr id="6" name="Straight Connector 5">
+            <a:extLst>
+              <a:ext uri="{FF2B5EF4-FFF2-40B4-BE49-F238E27FC236}">
+                <a16:creationId xmlns:a16="http://schemas.microsoft.com/office/drawing/2014/main" id="{AE40DD47-11F5-41F6-B8B0-295F3FE28AE8}"/>
+              </a:ext>
+            </a:extLst>
+          </p:cNvPr>
+          <p:cNvCxnSpPr>
+            <a:cxnSpLocks/>
+            <a:stCxn id="2" idx="0"/>
+          </p:cNvCxnSpPr>
+          <p:nvPr/>
+        </p:nvCxnSpPr>
+        <p:spPr>
+          <a:xfrm flipH="1" flipV="1">
+            <a:off x="2601310" y="2024711"/>
+            <a:ext cx="1040525" cy="1018034"/>
+          </a:xfrm>
+          <a:prstGeom prst="line">
+            <a:avLst/>
+          </a:prstGeom>
+        </p:spPr>
+        <p:style>
+          <a:lnRef idx="1">
+            <a:schemeClr val="accent1"/>
+          </a:lnRef>
+          <a:fillRef idx="0">
+            <a:schemeClr val="accent1"/>
+          </a:fillRef>
+          <a:effectRef idx="0">
+            <a:schemeClr val="accent1"/>
+          </a:effectRef>
+          <a:fontRef idx="minor">
+            <a:schemeClr val="tx1"/>
+          </a:fontRef>
+        </p:style>
+      </p:cxnSp>
+      <p:sp>
+        <p:nvSpPr>
+          <p:cNvPr id="11" name="TextBox 10">
+            <a:extLst>
+              <a:ext uri="{FF2B5EF4-FFF2-40B4-BE49-F238E27FC236}">
+                <a16:creationId xmlns:a16="http://schemas.microsoft.com/office/drawing/2014/main" id="{D28428B3-77AF-4142-9A3B-CEFDBAA75ADB}"/>
+              </a:ext>
+            </a:extLst>
+          </p:cNvPr>
+          <p:cNvSpPr txBox="1"/>
+          <p:nvPr/>
+        </p:nvSpPr>
+        <p:spPr>
+          <a:xfrm>
+            <a:off x="2585545" y="2236498"/>
+            <a:ext cx="301686" cy="369332"/>
+          </a:xfrm>
+          <a:prstGeom prst="rect">
+            <a:avLst/>
+          </a:prstGeom>
+          <a:noFill/>
+        </p:spPr>
+        <p:txBody>
+          <a:bodyPr wrap="none" rtlCol="0">
+            <a:spAutoFit/>
+          </a:bodyPr>
+          <a:lstStyle/>
+          <a:p>
+            <a:r>
+              <a:rPr lang="pt-BR" dirty="0"/>
+              <a:t>1</a:t>
+            </a:r>
+            <a:endParaRPr lang="en-US" dirty="0"/>
+          </a:p>
+        </p:txBody>
+      </p:sp>
+      <p:sp>
+        <p:nvSpPr>
+          <p:cNvPr id="12" name="TextBox 11">
+            <a:extLst>
+              <a:ext uri="{FF2B5EF4-FFF2-40B4-BE49-F238E27FC236}">
+                <a16:creationId xmlns:a16="http://schemas.microsoft.com/office/drawing/2014/main" id="{FA3AB427-9E25-4767-AC66-24939EA8D100}"/>
+              </a:ext>
+            </a:extLst>
+          </p:cNvPr>
+          <p:cNvSpPr txBox="1"/>
+          <p:nvPr/>
+        </p:nvSpPr>
+        <p:spPr>
+          <a:xfrm>
+            <a:off x="3563940" y="2673413"/>
+            <a:ext cx="306494" cy="369332"/>
+          </a:xfrm>
+          <a:prstGeom prst="rect">
+            <a:avLst/>
+          </a:prstGeom>
+          <a:noFill/>
+        </p:spPr>
+        <p:txBody>
+          <a:bodyPr wrap="none" rtlCol="0">
+            <a:spAutoFit/>
+          </a:bodyPr>
+          <a:lstStyle/>
+          <a:p>
+            <a:r>
+              <a:rPr lang="pt-BR" dirty="0"/>
+              <a:t>n</a:t>
+            </a:r>
+            <a:endParaRPr lang="en-US" dirty="0"/>
+          </a:p>
+        </p:txBody>
+      </p:sp>
     </p:spTree>
     <p:extLst>
       <p:ext uri="{BB962C8B-B14F-4D97-AF65-F5344CB8AC3E}">

</xml_diff>